<commit_message>
Creates new folder for the Teamtool Training card cluster
checked in TTO 01 „Trainingskarten gestalten“
</commit_message>
<xml_diff>
--- a/agile moves/01_templates/trainings_card_template.pptx
+++ b/agile moves/01_templates/trainings_card_template.pptx
@@ -832,14 +832,18 @@
             <a:pPr marL="0" lvl="0" algn="l"/>
             <a:r>
               <a:rPr lang="de-DE" dirty="0" smtClean="0"/>
-              <a:t>Überschrift </a:t>
+              <a:t>ÜBERSCHRIFT</a:t>
+            </a:r>
+            <a:r>
+              <a:rPr lang="de-DE" dirty="0" smtClean="0"/>
+              <a:t/>
             </a:r>
             <a:br>
               <a:rPr lang="de-DE" dirty="0" smtClean="0"/>
             </a:br>
             <a:r>
               <a:rPr lang="de-DE" dirty="0" smtClean="0"/>
-              <a:t>bearbeiten </a:t>
+              <a:t>BEARBEITEN </a:t>
             </a:r>
             <a:endParaRPr lang="de-DE" dirty="0"/>
           </a:p>
@@ -1544,7 +1548,7 @@
           <a:bodyPr/>
           <a:lstStyle/>
           <a:p>
-            <a:endParaRPr lang="de-DE"/>
+            <a:endParaRPr lang="de-DE" dirty="0"/>
           </a:p>
         </p:txBody>
       </p:sp>
@@ -1563,7 +1567,7 @@
           <a:bodyPr/>
           <a:lstStyle/>
           <a:p>
-            <a:endParaRPr lang="de-DE"/>
+            <a:endParaRPr lang="de-DE" dirty="0"/>
           </a:p>
         </p:txBody>
       </p:sp>

</xml_diff>